<commit_message>
Add chain build part on Présentation IT1.pptx
</commit_message>
<xml_diff>
--- a/Itérations/Présentation IT1.pptx
+++ b/Itérations/Présentation IT1.pptx
@@ -209,7 +209,7 @@
           <a:p>
             <a:fld id="{D3CBC699-985C-4670-9E09-1EFD0EAA6BEB}" type="datetimeFigureOut">
               <a:rPr lang="fr-FR" smtClean="0"/>
-              <a:t>20/11/2016</a:t>
+              <a:t>21/11/2016</a:t>
             </a:fld>
             <a:endParaRPr lang="fr-FR"/>
           </a:p>
@@ -1213,7 +1213,6 @@
               <a:rPr lang="fr-FR"/>
               <a:t>Modifiez le style du titre</a:t>
             </a:r>
-            <a:endParaRPr lang="fr-FR"/>
           </a:p>
         </p:txBody>
       </p:sp>
@@ -1278,7 +1277,6 @@
               <a:rPr lang="fr-FR"/>
               <a:t>Modifier le style des sous-titres du masque</a:t>
             </a:r>
-            <a:endParaRPr lang="fr-FR"/>
           </a:p>
         </p:txBody>
       </p:sp>
@@ -1299,7 +1297,7 @@
           <a:p>
             <a:fld id="{0800570A-E134-4FF7-B88B-964C98FC0B70}" type="datetime1">
               <a:rPr lang="fr-FR" smtClean="0"/>
-              <a:t>20/11/2016</a:t>
+              <a:t>21/11/2016</a:t>
             </a:fld>
             <a:endParaRPr lang="fr-FR"/>
           </a:p>
@@ -1324,7 +1322,6 @@
               <a:rPr lang="fr-FR"/>
               <a:t>Galt – PI S5 IL – Itération 1</a:t>
             </a:r>
-            <a:endParaRPr lang="fr-FR"/>
           </a:p>
         </p:txBody>
       </p:sp>
@@ -1400,7 +1397,6 @@
               <a:rPr lang="fr-FR"/>
               <a:t>Modifiez le style du titre</a:t>
             </a:r>
-            <a:endParaRPr lang="fr-FR"/>
           </a:p>
         </p:txBody>
       </p:sp>
@@ -1452,7 +1448,6 @@
               <a:rPr lang="fr-FR"/>
               <a:t>Cinquième niveau</a:t>
             </a:r>
-            <a:endParaRPr lang="fr-FR"/>
           </a:p>
         </p:txBody>
       </p:sp>
@@ -1473,7 +1468,7 @@
           <a:p>
             <a:fld id="{D0150167-DB67-48AE-815C-989A285B9410}" type="datetime1">
               <a:rPr lang="fr-FR" smtClean="0"/>
-              <a:t>20/11/2016</a:t>
+              <a:t>21/11/2016</a:t>
             </a:fld>
             <a:endParaRPr lang="fr-FR"/>
           </a:p>
@@ -1498,7 +1493,6 @@
               <a:rPr lang="fr-FR"/>
               <a:t>Galt – PI S5 IL – Itération 1</a:t>
             </a:r>
-            <a:endParaRPr lang="fr-FR"/>
           </a:p>
         </p:txBody>
       </p:sp>
@@ -1579,7 +1573,6 @@
               <a:rPr lang="fr-FR"/>
               <a:t>Modifiez le style du titre</a:t>
             </a:r>
-            <a:endParaRPr lang="fr-FR"/>
           </a:p>
         </p:txBody>
       </p:sp>
@@ -1636,7 +1629,6 @@
               <a:rPr lang="fr-FR"/>
               <a:t>Cinquième niveau</a:t>
             </a:r>
-            <a:endParaRPr lang="fr-FR"/>
           </a:p>
         </p:txBody>
       </p:sp>
@@ -1657,7 +1649,7 @@
           <a:p>
             <a:fld id="{DF07C22F-CFCC-4AAD-85BE-6196114EF788}" type="datetime1">
               <a:rPr lang="fr-FR" smtClean="0"/>
-              <a:t>20/11/2016</a:t>
+              <a:t>21/11/2016</a:t>
             </a:fld>
             <a:endParaRPr lang="fr-FR"/>
           </a:p>
@@ -1682,7 +1674,6 @@
               <a:rPr lang="fr-FR"/>
               <a:t>Galt – PI S5 IL – Itération 1</a:t>
             </a:r>
-            <a:endParaRPr lang="fr-FR"/>
           </a:p>
         </p:txBody>
       </p:sp>
@@ -2021,7 +2012,7 @@
             <a:fld id="{9905D2EB-A0C9-4269-BED7-F488BFFF1574}" type="datetime1">
               <a:rPr lang="fr-FR" smtClean="0"/>
               <a:pPr/>
-              <a:t>20/11/2016</a:t>
+              <a:t>21/11/2016</a:t>
             </a:fld>
             <a:endParaRPr lang="fr-FR" dirty="0"/>
           </a:p>
@@ -2426,7 +2417,7 @@
             <a:fld id="{9905D2EB-A0C9-4269-BED7-F488BFFF1574}" type="datetime1">
               <a:rPr lang="fr-FR" smtClean="0"/>
               <a:pPr/>
-              <a:t>20/11/2016</a:t>
+              <a:t>21/11/2016</a:t>
             </a:fld>
             <a:endParaRPr lang="fr-FR" dirty="0"/>
           </a:p>
@@ -2612,7 +2603,6 @@
               <a:rPr lang="fr-FR"/>
               <a:t>Modifiez le style du titre</a:t>
             </a:r>
-            <a:endParaRPr lang="fr-FR"/>
           </a:p>
         </p:txBody>
       </p:sp>
@@ -2669,7 +2659,6 @@
               <a:rPr lang="fr-FR"/>
               <a:t>Cinquième niveau</a:t>
             </a:r>
-            <a:endParaRPr lang="fr-FR"/>
           </a:p>
         </p:txBody>
       </p:sp>
@@ -2726,7 +2715,6 @@
               <a:rPr lang="fr-FR"/>
               <a:t>Cinquième niveau</a:t>
             </a:r>
-            <a:endParaRPr lang="fr-FR"/>
           </a:p>
         </p:txBody>
       </p:sp>
@@ -2747,7 +2735,7 @@
           <a:p>
             <a:fld id="{F76D856D-7132-4157-A039-CF702331B8D5}" type="datetime1">
               <a:rPr lang="fr-FR" smtClean="0"/>
-              <a:t>20/11/2016</a:t>
+              <a:t>21/11/2016</a:t>
             </a:fld>
             <a:endParaRPr lang="fr-FR"/>
           </a:p>
@@ -2772,7 +2760,6 @@
               <a:rPr lang="fr-FR"/>
               <a:t>Galt – PI S5 IL – Itération 1</a:t>
             </a:r>
-            <a:endParaRPr lang="fr-FR"/>
           </a:p>
         </p:txBody>
       </p:sp>
@@ -2853,7 +2840,6 @@
               <a:rPr lang="fr-FR"/>
               <a:t>Modifiez le style du titre</a:t>
             </a:r>
-            <a:endParaRPr lang="fr-FR"/>
           </a:p>
         </p:txBody>
       </p:sp>
@@ -2975,7 +2961,6 @@
               <a:rPr lang="fr-FR"/>
               <a:t>Cinquième niveau</a:t>
             </a:r>
-            <a:endParaRPr lang="fr-FR"/>
           </a:p>
         </p:txBody>
       </p:sp>
@@ -3097,7 +3082,6 @@
               <a:rPr lang="fr-FR"/>
               <a:t>Cinquième niveau</a:t>
             </a:r>
-            <a:endParaRPr lang="fr-FR"/>
           </a:p>
         </p:txBody>
       </p:sp>
@@ -3118,7 +3102,7 @@
           <a:p>
             <a:fld id="{FCBF5032-FAF2-4AA7-A70E-1DE20563A11B}" type="datetime1">
               <a:rPr lang="fr-FR" smtClean="0"/>
-              <a:t>20/11/2016</a:t>
+              <a:t>21/11/2016</a:t>
             </a:fld>
             <a:endParaRPr lang="fr-FR"/>
           </a:p>
@@ -3143,7 +3127,6 @@
               <a:rPr lang="fr-FR"/>
               <a:t>Galt – PI S5 IL – Itération 1</a:t>
             </a:r>
-            <a:endParaRPr lang="fr-FR"/>
           </a:p>
         </p:txBody>
       </p:sp>
@@ -3219,7 +3202,6 @@
               <a:rPr lang="fr-FR"/>
               <a:t>Modifiez le style du titre</a:t>
             </a:r>
-            <a:endParaRPr lang="fr-FR"/>
           </a:p>
         </p:txBody>
       </p:sp>
@@ -3240,7 +3222,7 @@
           <a:p>
             <a:fld id="{5B39B4BA-208E-4A91-835F-819C41282C96}" type="datetime1">
               <a:rPr lang="fr-FR" smtClean="0"/>
-              <a:t>20/11/2016</a:t>
+              <a:t>21/11/2016</a:t>
             </a:fld>
             <a:endParaRPr lang="fr-FR"/>
           </a:p>
@@ -3265,7 +3247,6 @@
               <a:rPr lang="fr-FR"/>
               <a:t>Galt – PI S5 IL – Itération 1</a:t>
             </a:r>
-            <a:endParaRPr lang="fr-FR"/>
           </a:p>
         </p:txBody>
       </p:sp>
@@ -3339,7 +3320,7 @@
           <a:p>
             <a:fld id="{22BD55AD-9052-4E25-B05B-88989C2E37BE}" type="datetime1">
               <a:rPr lang="fr-FR" smtClean="0"/>
-              <a:t>20/11/2016</a:t>
+              <a:t>21/11/2016</a:t>
             </a:fld>
             <a:endParaRPr lang="fr-FR"/>
           </a:p>
@@ -3364,7 +3345,6 @@
               <a:rPr lang="fr-FR"/>
               <a:t>Galt – PI S5 IL – Itération 1</a:t>
             </a:r>
-            <a:endParaRPr lang="fr-FR"/>
           </a:p>
         </p:txBody>
       </p:sp>
@@ -3449,7 +3429,6 @@
               <a:rPr lang="fr-FR"/>
               <a:t>Modifiez le style du titre</a:t>
             </a:r>
-            <a:endParaRPr lang="fr-FR"/>
           </a:p>
         </p:txBody>
       </p:sp>
@@ -3534,7 +3513,6 @@
               <a:rPr lang="fr-FR"/>
               <a:t>Cinquième niveau</a:t>
             </a:r>
-            <a:endParaRPr lang="fr-FR"/>
           </a:p>
         </p:txBody>
       </p:sp>
@@ -3620,7 +3598,7 @@
           <a:p>
             <a:fld id="{FE1C6AF5-3D97-48D9-A9F8-5FC5FD4CE3DC}" type="datetime1">
               <a:rPr lang="fr-FR" smtClean="0"/>
-              <a:t>20/11/2016</a:t>
+              <a:t>21/11/2016</a:t>
             </a:fld>
             <a:endParaRPr lang="fr-FR"/>
           </a:p>
@@ -3645,7 +3623,6 @@
               <a:rPr lang="fr-FR"/>
               <a:t>Galt – PI S5 IL – Itération 1</a:t>
             </a:r>
-            <a:endParaRPr lang="fr-FR"/>
           </a:p>
         </p:txBody>
       </p:sp>
@@ -3730,7 +3707,6 @@
               <a:rPr lang="fr-FR"/>
               <a:t>Modifiez le style du titre</a:t>
             </a:r>
-            <a:endParaRPr lang="fr-FR"/>
           </a:p>
         </p:txBody>
       </p:sp>
@@ -3877,7 +3853,7 @@
           <a:p>
             <a:fld id="{44AD68A8-7045-4761-88BB-6D7C321D776F}" type="datetime1">
               <a:rPr lang="fr-FR" smtClean="0"/>
-              <a:t>20/11/2016</a:t>
+              <a:t>21/11/2016</a:t>
             </a:fld>
             <a:endParaRPr lang="fr-FR"/>
           </a:p>
@@ -3902,7 +3878,6 @@
               <a:rPr lang="fr-FR"/>
               <a:t>Galt – PI S5 IL – Itération 1</a:t>
             </a:r>
-            <a:endParaRPr lang="fr-FR"/>
           </a:p>
         </p:txBody>
       </p:sp>
@@ -4051,7 +4026,6 @@
               <a:rPr lang="fr-FR"/>
               <a:t>Modifiez le style du titre</a:t>
             </a:r>
-            <a:endParaRPr lang="fr-FR"/>
           </a:p>
         </p:txBody>
       </p:sp>
@@ -4113,7 +4087,6 @@
               <a:rPr lang="fr-FR"/>
               <a:t>Cinquième niveau</a:t>
             </a:r>
-            <a:endParaRPr lang="fr-FR"/>
           </a:p>
         </p:txBody>
       </p:sp>
@@ -4152,7 +4125,7 @@
           <a:p>
             <a:fld id="{B0A1D0FA-A7FA-427E-B7E5-2C949F2ACC4D}" type="datetime1">
               <a:rPr lang="fr-FR" smtClean="0"/>
-              <a:t>20/11/2016</a:t>
+              <a:t>21/11/2016</a:t>
             </a:fld>
             <a:endParaRPr lang="fr-FR"/>
           </a:p>
@@ -4195,7 +4168,6 @@
               <a:rPr lang="fr-FR"/>
               <a:t>Galt – PI S5 IL – Itération 1</a:t>
             </a:r>
-            <a:endParaRPr lang="fr-FR"/>
           </a:p>
         </p:txBody>
       </p:sp>
@@ -5062,7 +5034,7 @@
           <a:p>
             <a:fld id="{9AEBC41D-566D-471B-BC6B-E875D8BD5980}" type="datetime1">
               <a:rPr lang="fr-FR" smtClean="0"/>
-              <a:t>20/11/2016</a:t>
+              <a:t>21/11/2016</a:t>
             </a:fld>
             <a:endParaRPr lang="fr-FR" dirty="0"/>
           </a:p>
@@ -5208,7 +5180,68 @@
           <a:bodyPr/>
           <a:lstStyle/>
           <a:p>
-            <a:endParaRPr lang="fr-FR"/>
+            <a:r>
+              <a:rPr lang="fr-FR" dirty="0"/>
+              <a:t>Clean des dossiers bin et </a:t>
+            </a:r>
+            <a:r>
+              <a:rPr lang="fr-FR" dirty="0" err="1"/>
+              <a:t>obj</a:t>
+            </a:r>
+            <a:endParaRPr lang="fr-FR" dirty="0"/>
+          </a:p>
+          <a:p>
+            <a:r>
+              <a:rPr lang="fr-FR" dirty="0"/>
+              <a:t>Restore des dépendances</a:t>
+            </a:r>
+          </a:p>
+          <a:p>
+            <a:r>
+              <a:rPr lang="fr-FR" dirty="0"/>
+              <a:t>Restore d’outils spécifiques</a:t>
+            </a:r>
+          </a:p>
+          <a:p>
+            <a:r>
+              <a:rPr lang="fr-FR" dirty="0"/>
+              <a:t>Compilation</a:t>
+            </a:r>
+          </a:p>
+          <a:p>
+            <a:r>
+              <a:rPr lang="fr-FR" dirty="0"/>
+              <a:t>Test unitaire </a:t>
+            </a:r>
+          </a:p>
+          <a:p>
+            <a:r>
+              <a:rPr lang="fr-FR" dirty="0"/>
+              <a:t>Couverture de code</a:t>
+            </a:r>
+          </a:p>
+          <a:p>
+            <a:r>
+              <a:rPr lang="fr-FR" dirty="0" err="1"/>
+              <a:t>Continuous</a:t>
+            </a:r>
+            <a:r>
+              <a:rPr lang="fr-FR" dirty="0"/>
+              <a:t> </a:t>
+            </a:r>
+            <a:r>
+              <a:rPr lang="fr-FR" dirty="0" err="1"/>
+              <a:t>Integration</a:t>
+            </a:r>
+            <a:r>
+              <a:rPr lang="fr-FR" dirty="0"/>
+              <a:t> sur </a:t>
+            </a:r>
+            <a:r>
+              <a:rPr lang="fr-FR" dirty="0" err="1"/>
+              <a:t>AppVeyor</a:t>
+            </a:r>
+            <a:endParaRPr lang="fr-FR" dirty="0"/>
           </a:p>
         </p:txBody>
       </p:sp>
@@ -5230,7 +5263,7 @@
             <a:fld id="{9905D2EB-A0C9-4269-BED7-F488BFFF1574}" type="datetime1">
               <a:rPr lang="fr-FR" smtClean="0"/>
               <a:pPr/>
-              <a:t>20/11/2016</a:t>
+              <a:t>21/11/2016</a:t>
             </a:fld>
             <a:endParaRPr lang="fr-FR" dirty="0"/>
           </a:p>
@@ -5463,7 +5496,7 @@
             <a:fld id="{9905D2EB-A0C9-4269-BED7-F488BFFF1574}" type="datetime1">
               <a:rPr lang="fr-FR" smtClean="0"/>
               <a:pPr/>
-              <a:t>20/11/2016</a:t>
+              <a:t>21/11/2016</a:t>
             </a:fld>
             <a:endParaRPr lang="fr-FR" dirty="0"/>
           </a:p>
@@ -5692,7 +5725,7 @@
             <a:fld id="{9905D2EB-A0C9-4269-BED7-F488BFFF1574}" type="datetime1">
               <a:rPr lang="fr-FR" smtClean="0"/>
               <a:pPr/>
-              <a:t>20/11/2016</a:t>
+              <a:t>21/11/2016</a:t>
             </a:fld>
             <a:endParaRPr lang="fr-FR" dirty="0"/>
           </a:p>
@@ -5870,7 +5903,7 @@
             <a:fld id="{9905D2EB-A0C9-4269-BED7-F488BFFF1574}" type="datetime1">
               <a:rPr lang="fr-FR" smtClean="0"/>
               <a:pPr/>
-              <a:t>20/11/2016</a:t>
+              <a:t>21/11/2016</a:t>
             </a:fld>
             <a:endParaRPr lang="fr-FR" dirty="0"/>
           </a:p>
@@ -6169,7 +6202,7 @@
             <a:fld id="{9905D2EB-A0C9-4269-BED7-F488BFFF1574}" type="datetime1">
               <a:rPr lang="fr-FR" smtClean="0"/>
               <a:pPr/>
-              <a:t>20/11/2016</a:t>
+              <a:t>21/11/2016</a:t>
             </a:fld>
             <a:endParaRPr lang="fr-FR" dirty="0"/>
           </a:p>

</xml_diff>

<commit_message>
Add of dependency graph in diapo IT1
</commit_message>
<xml_diff>
--- a/Itérations/Présentation IT1.pptx
+++ b/Itérations/Présentation IT1.pptx
@@ -5881,6 +5881,59 @@
           <a:bodyPr/>
           <a:lstStyle/>
           <a:p>
+            <a:r>
+              <a:rPr lang="fr-FR" dirty="0"/>
+              <a:t>Utilisation d’un objet comprenant toutes les informations à afficher</a:t>
+            </a:r>
+          </a:p>
+          <a:p>
+            <a:r>
+              <a:rPr lang="fr-FR" dirty="0"/>
+              <a:t>Génération automatique d’un arbre déployable à partir de ces informations</a:t>
+            </a:r>
+          </a:p>
+          <a:p>
+            <a:r>
+              <a:rPr lang="fr-FR" dirty="0"/>
+              <a:t>Affichage des informations importantes des packages</a:t>
+            </a:r>
+          </a:p>
+          <a:p>
+            <a:r>
+              <a:rPr lang="fr-FR" dirty="0"/>
+              <a:t>A faire pour la prochaine itération :</a:t>
+            </a:r>
+          </a:p>
+          <a:p>
+            <a:pPr lvl="1"/>
+            <a:r>
+              <a:rPr lang="fr-FR" dirty="0"/>
+              <a:t>Possibilité de se déplacer dans le graph</a:t>
+            </a:r>
+          </a:p>
+          <a:p>
+            <a:pPr lvl="1"/>
+            <a:r>
+              <a:rPr lang="fr-FR" dirty="0"/>
+              <a:t>Utiliser des données venant d’un fichier </a:t>
+            </a:r>
+            <a:r>
+              <a:rPr lang="fr-FR" dirty="0" err="1"/>
+              <a:t>json</a:t>
+            </a:r>
+            <a:endParaRPr lang="fr-FR" dirty="0"/>
+          </a:p>
+          <a:p>
+            <a:pPr lvl="1"/>
+            <a:r>
+              <a:rPr lang="fr-FR"/>
+              <a:t>Améliorer l’aspect graphique</a:t>
+            </a:r>
+          </a:p>
+          <a:p>
+            <a:pPr marL="0" indent="0">
+              <a:buNone/>
+            </a:pPr>
             <a:endParaRPr lang="fr-FR"/>
           </a:p>
         </p:txBody>

</xml_diff>